<commit_message>
Minor update in the deck
</commit_message>
<xml_diff>
--- a/deck/CLIM365 - Manage M365 Workloads - Arjun Menon.pptx
+++ b/deck/CLIM365 - Manage M365 Workloads - Arjun Menon.pptx
@@ -255,7 +255,7 @@
           <a:p>
             <a:fld id="{3E82F302-A7C8-034E-97BB-FC8263E03487}" type="datetimeFigureOut">
               <a:rPr lang="en-US" smtClean="0"/>
-              <a:t>2/14/25</a:t>
+              <a:t>2/15/25</a:t>
             </a:fld>
             <a:endParaRPr lang="en-US"/>
           </a:p>
@@ -420,7 +420,7 @@
           <a:p>
             <a:fld id="{572B889E-FB6B-4D81-8FCC-1555F636B1A5}" type="datetimeFigureOut">
               <a:rPr lang="x-none" smtClean="0"/>
-              <a:t>2/14/25</a:t>
+              <a:t>2/15/25</a:t>
             </a:fld>
             <a:endParaRPr lang="x-none"/>
           </a:p>
@@ -2331,13 +2331,13 @@
   <p:clrMapOvr>
     <a:masterClrMapping/>
   </p:clrMapOvr>
-  <mc:AlternateContent xmlns:mc="http://schemas.openxmlformats.org/markup-compatibility/2006">
-    <mc:Choice xmlns:p14="http://schemas.microsoft.com/office/powerpoint/2010/main" Requires="p14">
+  <mc:AlternateContent xmlns:mc="http://schemas.openxmlformats.org/markup-compatibility/2006" xmlns:p14="http://schemas.microsoft.com/office/powerpoint/2010/main">
+    <mc:Choice Requires="p14">
       <p:transition spd="med" p14:dur="700">
         <p:fade/>
       </p:transition>
     </mc:Choice>
-    <mc:Fallback>
+    <mc:Fallback xmlns="">
       <p:transition spd="med">
         <p:fade/>
       </p:transition>
@@ -2712,13 +2712,25 @@
               <a:rPr lang="en-US" sz="1800" b="1" dirty="0">
                 <a:latin typeface="+mj-lt"/>
               </a:rPr>
-              <a:t>Service Owner – Copilot </a:t>
-            </a:r>
-            <a:r>
-              <a:rPr lang="en-US" sz="1800" dirty="0">
+              <a:t>Service Owner – </a:t>
+            </a:r>
+            <a:r>
+              <a:rPr lang="en-US" sz="1800" b="1">
                 <a:latin typeface="+mj-lt"/>
               </a:rPr>
-              <a:t>with Nokia</a:t>
+              <a:t>Copilot </a:t>
+            </a:r>
+            <a:r>
+              <a:rPr lang="en-US" sz="1800">
+                <a:latin typeface="+mj-lt"/>
+              </a:rPr>
+              <a:t>for </a:t>
+            </a:r>
+            <a:r>
+              <a:rPr lang="en-US" sz="1800" b="1">
+                <a:latin typeface="+mj-lt"/>
+              </a:rPr>
+              <a:t>Nokia</a:t>
             </a:r>
             <a:endParaRPr lang="en-IN" sz="1800" dirty="0">
               <a:latin typeface="+mj-lt"/>
@@ -9167,15 +9179,6 @@
 </file>
 
 <file path=customXml/item1.xml><?xml version="1.0" encoding="utf-8"?>
-<?mso-contentType ?>
-<FormTemplates xmlns="http://schemas.microsoft.com/sharepoint/v3/contenttype/forms">
-  <Display>DocumentLibraryForm</Display>
-  <Edit>DocumentLibraryForm</Edit>
-  <New>DocumentLibraryForm</New>
-</FormTemplates>
-</file>
-
-<file path=customXml/item2.xml><?xml version="1.0" encoding="utf-8"?>
 <ct:contentTypeSchema xmlns:ct="http://schemas.microsoft.com/office/2006/metadata/contentType" xmlns:ma="http://schemas.microsoft.com/office/2006/metadata/properties/metaAttributes" ct:_="" ma:_="" ma:contentTypeName="Dokument" ma:contentTypeID="0x0101001953E0CDE6A38E419236C03EEB01435C" ma:contentTypeVersion="7" ma:contentTypeDescription="Ein neues Dokument erstellen." ma:contentTypeScope="" ma:versionID="35377ed61abc787e6d78f6dd36362cda">
   <xsd:schema xmlns:xsd="http://www.w3.org/2001/XMLSchema" xmlns:xs="http://www.w3.org/2001/XMLSchema" xmlns:p="http://schemas.microsoft.com/office/2006/metadata/properties" xmlns:ns2="74098b8b-3ead-4c65-9f72-d36b5831b20e" xmlns:ns3="c25f9c22-fc1f-4454-8c46-2969b0535af5" targetNamespace="http://schemas.microsoft.com/office/2006/metadata/properties" ma:root="true" ma:fieldsID="77ed309eff22ef73c9fccc7a3e12d61f" ns2:_="" ns3:_="">
     <xsd:import namespace="74098b8b-3ead-4c65-9f72-d36b5831b20e"/>
@@ -9358,6 +9361,15 @@
 </ct:contentTypeSchema>
 </file>
 
+<file path=customXml/item2.xml><?xml version="1.0" encoding="utf-8"?>
+<?mso-contentType ?>
+<FormTemplates xmlns="http://schemas.microsoft.com/sharepoint/v3/contenttype/forms">
+  <Display>DocumentLibraryForm</Display>
+  <Edit>DocumentLibraryForm</Edit>
+  <New>DocumentLibraryForm</New>
+</FormTemplates>
+</file>
+
 <file path=customXml/item3.xml><?xml version="1.0" encoding="utf-8"?>
 <p:properties xmlns:p="http://schemas.microsoft.com/office/2006/metadata/properties" xmlns:xsi="http://www.w3.org/2001/XMLSchema-instance" xmlns:pc="http://schemas.microsoft.com/office/infopath/2007/PartnerControls">
   <documentManagement/>
@@ -9365,14 +9377,6 @@
 </file>
 
 <file path=customXml/itemProps1.xml><?xml version="1.0" encoding="utf-8"?>
-<ds:datastoreItem xmlns:ds="http://schemas.openxmlformats.org/officeDocument/2006/customXml" ds:itemID="{D6CE178E-7963-4EFA-83EF-8E123369E092}">
-  <ds:schemaRefs>
-    <ds:schemaRef ds:uri="http://schemas.microsoft.com/sharepoint/v3/contenttype/forms"/>
-  </ds:schemaRefs>
-</ds:datastoreItem>
-</file>
-
-<file path=customXml/itemProps2.xml><?xml version="1.0" encoding="utf-8"?>
 <ds:datastoreItem xmlns:ds="http://schemas.openxmlformats.org/officeDocument/2006/customXml" ds:itemID="{26056780-E2CD-484B-90C1-F30A19D8A5D9}">
   <ds:schemaRefs>
     <ds:schemaRef ds:uri="74098b8b-3ead-4c65-9f72-d36b5831b20e"/>
@@ -9387,6 +9391,14 @@
     <ds:schemaRef ds:uri="http://schemas.microsoft.com/office/infopath/2007/PartnerControls"/>
     <ds:schemaRef ds:uri="http://schemas.openxmlformats.org/package/2006/metadata/core-properties"/>
     <ds:schemaRef ds:uri="http://www.w3.org/2001/XMLSchema"/>
+  </ds:schemaRefs>
+</ds:datastoreItem>
+</file>
+
+<file path=customXml/itemProps2.xml><?xml version="1.0" encoding="utf-8"?>
+<ds:datastoreItem xmlns:ds="http://schemas.openxmlformats.org/officeDocument/2006/customXml" ds:itemID="{D6CE178E-7963-4EFA-83EF-8E123369E092}">
+  <ds:schemaRefs>
+    <ds:schemaRef ds:uri="http://schemas.microsoft.com/sharepoint/v3/contenttype/forms"/>
   </ds:schemaRefs>
 </ds:datastoreItem>
 </file>

</xml_diff>